<commit_message>
lecture 11 session 2
</commit_message>
<xml_diff>
--- a/lectures/11/2_Analysis and Interpretation Individual Variables Independently.pptx
+++ b/lectures/11/2_Analysis and Interpretation Individual Variables Independently.pptx
@@ -245,7 +245,7 @@
           <a:p>
             <a:fld id="{73B2889B-A0AC-4482-8592-5C96F2309420}" type="datetimeFigureOut">
               <a:rPr lang="en-US" smtClean="0"/>
-              <a:t>11/2/2021</a:t>
+              <a:t>4/6/2022</a:t>
             </a:fld>
             <a:endParaRPr lang="en-US"/>
           </a:p>
@@ -422,7 +422,7 @@
           <a:p>
             <a:fld id="{830EB223-FFC0-462A-A3B8-EAA7CE0F8CBD}" type="datetimeFigureOut">
               <a:rPr lang="en-US" smtClean="0"/>
-              <a:t>11/2/2021</a:t>
+              <a:t>4/6/2022</a:t>
             </a:fld>
             <a:endParaRPr lang="en-US" dirty="0"/>
           </a:p>
@@ -846,9 +846,6 @@
               <a:t>Open histogram to show  students how to do it</a:t>
             </a:r>
           </a:p>
-          <a:p>
-            <a:endParaRPr lang="en-US" dirty="0"/>
-          </a:p>
         </p:txBody>
       </p:sp>
       <p:sp>
@@ -1957,7 +1954,7 @@
           <a:p>
             <a:r>
               <a:rPr lang="en-US" dirty="0"/>
-              <a:t>So to decide on which analysis you can carry out, you first have to ask yourself it the variable to be … </a:t>
+              <a:t>So to decide on which analysis you can carry out, you first have to ask yourself is the variable to be … </a:t>
             </a:r>
           </a:p>
           <a:p>
@@ -2718,7 +2715,7 @@
           <a:p>
             <a:fld id="{DECF21A4-E71B-4D3A-AF45-E989C23A7BB1}" type="datetimeFigureOut">
               <a:rPr lang="en-US" smtClean="0"/>
-              <a:t>11/2/2021</a:t>
+              <a:t>4/6/2022</a:t>
             </a:fld>
             <a:endParaRPr lang="en-US" dirty="0"/>
           </a:p>
@@ -2916,7 +2913,7 @@
           <a:p>
             <a:fld id="{DECF21A4-E71B-4D3A-AF45-E989C23A7BB1}" type="datetimeFigureOut">
               <a:rPr lang="en-US" smtClean="0"/>
-              <a:t>11/2/2021</a:t>
+              <a:t>4/6/2022</a:t>
             </a:fld>
             <a:endParaRPr lang="en-US" dirty="0"/>
           </a:p>
@@ -3124,7 +3121,7 @@
           <a:p>
             <a:fld id="{DECF21A4-E71B-4D3A-AF45-E989C23A7BB1}" type="datetimeFigureOut">
               <a:rPr lang="en-US" smtClean="0"/>
-              <a:t>11/2/2021</a:t>
+              <a:t>4/6/2022</a:t>
             </a:fld>
             <a:endParaRPr lang="en-US" dirty="0"/>
           </a:p>
@@ -3322,7 +3319,7 @@
           <a:p>
             <a:fld id="{DECF21A4-E71B-4D3A-AF45-E989C23A7BB1}" type="datetimeFigureOut">
               <a:rPr lang="en-US" smtClean="0"/>
-              <a:t>11/2/2021</a:t>
+              <a:t>4/6/2022</a:t>
             </a:fld>
             <a:endParaRPr lang="en-US" dirty="0"/>
           </a:p>
@@ -3597,7 +3594,7 @@
           <a:p>
             <a:fld id="{DECF21A4-E71B-4D3A-AF45-E989C23A7BB1}" type="datetimeFigureOut">
               <a:rPr lang="en-US" smtClean="0"/>
-              <a:t>11/2/2021</a:t>
+              <a:t>4/6/2022</a:t>
             </a:fld>
             <a:endParaRPr lang="en-US" dirty="0"/>
           </a:p>
@@ -3862,7 +3859,7 @@
           <a:p>
             <a:fld id="{DECF21A4-E71B-4D3A-AF45-E989C23A7BB1}" type="datetimeFigureOut">
               <a:rPr lang="en-US" smtClean="0"/>
-              <a:t>11/2/2021</a:t>
+              <a:t>4/6/2022</a:t>
             </a:fld>
             <a:endParaRPr lang="en-US" dirty="0"/>
           </a:p>
@@ -4274,7 +4271,7 @@
           <a:p>
             <a:fld id="{DECF21A4-E71B-4D3A-AF45-E989C23A7BB1}" type="datetimeFigureOut">
               <a:rPr lang="en-US" smtClean="0"/>
-              <a:t>11/2/2021</a:t>
+              <a:t>4/6/2022</a:t>
             </a:fld>
             <a:endParaRPr lang="en-US" dirty="0"/>
           </a:p>
@@ -4415,7 +4412,7 @@
           <a:p>
             <a:fld id="{DECF21A4-E71B-4D3A-AF45-E989C23A7BB1}" type="datetimeFigureOut">
               <a:rPr lang="en-US" smtClean="0"/>
-              <a:t>11/2/2021</a:t>
+              <a:t>4/6/2022</a:t>
             </a:fld>
             <a:endParaRPr lang="en-US" dirty="0"/>
           </a:p>
@@ -4528,7 +4525,7 @@
           <a:p>
             <a:fld id="{DECF21A4-E71B-4D3A-AF45-E989C23A7BB1}" type="datetimeFigureOut">
               <a:rPr lang="en-US" smtClean="0"/>
-              <a:t>11/2/2021</a:t>
+              <a:t>4/6/2022</a:t>
             </a:fld>
             <a:endParaRPr lang="en-US" dirty="0"/>
           </a:p>
@@ -4839,7 +4836,7 @@
           <a:p>
             <a:fld id="{DECF21A4-E71B-4D3A-AF45-E989C23A7BB1}" type="datetimeFigureOut">
               <a:rPr lang="en-US" smtClean="0"/>
-              <a:t>11/2/2021</a:t>
+              <a:t>4/6/2022</a:t>
             </a:fld>
             <a:endParaRPr lang="en-US" dirty="0"/>
           </a:p>
@@ -5131,7 +5128,7 @@
           <a:p>
             <a:fld id="{DECF21A4-E71B-4D3A-AF45-E989C23A7BB1}" type="datetimeFigureOut">
               <a:rPr lang="en-US" smtClean="0"/>
-              <a:t>11/2/2021</a:t>
+              <a:t>4/6/2022</a:t>
             </a:fld>
             <a:endParaRPr lang="en-US" dirty="0"/>
           </a:p>
@@ -5372,7 +5369,7 @@
           <a:p>
             <a:fld id="{DECF21A4-E71B-4D3A-AF45-E989C23A7BB1}" type="datetimeFigureOut">
               <a:rPr lang="en-US" smtClean="0"/>
-              <a:t>11/2/2021</a:t>
+              <a:t>4/6/2022</a:t>
             </a:fld>
             <a:endParaRPr lang="en-US" dirty="0"/>
           </a:p>
@@ -11202,21 +11199,21 @@
           <a:lstStyle/>
           <a:p>
             <a:r>
-              <a:rPr lang="en-US" sz="2000"/>
-              <a:t>Sometimes it is useful to convert continuous measure to categorical measures </a:t>
+              <a:rPr lang="en-US" sz="2000" dirty="0"/>
+              <a:t>Sometimes it is useful to convert continuous measures to categorical measures</a:t>
             </a:r>
           </a:p>
           <a:p>
             <a:pPr lvl="1"/>
             <a:r>
-              <a:rPr lang="en-US" sz="2000"/>
+              <a:rPr lang="en-US" sz="2000" dirty="0"/>
               <a:t>This is legitimate because measures at higher levels of measurement (in this case, continuous measures) have all the properties of measures at lower levels of measurement (categorical measures) </a:t>
             </a:r>
           </a:p>
           <a:p>
             <a:pPr lvl="1"/>
             <a:r>
-              <a:rPr lang="en-US" sz="2000"/>
+              <a:rPr lang="en-US" sz="2000" dirty="0"/>
               <a:t>Why do this? Ease of interpretation</a:t>
             </a:r>
           </a:p>
@@ -11725,6 +11722,183 @@
   <p:clrMapOvr>
     <a:masterClrMapping/>
   </p:clrMapOvr>
+  <p:timing>
+    <p:tnLst>
+      <p:par>
+        <p:cTn id="1" dur="indefinite" restart="never" nodeType="tmRoot">
+          <p:childTnLst>
+            <p:seq concurrent="1" nextAc="seek">
+              <p:cTn id="2" dur="indefinite" nodeType="mainSeq">
+                <p:childTnLst>
+                  <p:par>
+                    <p:cTn id="3" fill="hold">
+                      <p:stCondLst>
+                        <p:cond delay="indefinite"/>
+                      </p:stCondLst>
+                      <p:childTnLst>
+                        <p:par>
+                          <p:cTn id="4" fill="hold">
+                            <p:stCondLst>
+                              <p:cond delay="0"/>
+                            </p:stCondLst>
+                            <p:childTnLst>
+                              <p:par>
+                                <p:cTn id="5" presetID="1" presetClass="entr" presetSubtype="0" fill="hold" nodeType="clickEffect">
+                                  <p:stCondLst>
+                                    <p:cond delay="0"/>
+                                  </p:stCondLst>
+                                  <p:childTnLst>
+                                    <p:set>
+                                      <p:cBhvr>
+                                        <p:cTn id="6" dur="1" fill="hold">
+                                          <p:stCondLst>
+                                            <p:cond delay="0"/>
+                                          </p:stCondLst>
+                                        </p:cTn>
+                                        <p:tgtEl>
+                                          <p:spTgt spid="3">
+                                            <p:txEl>
+                                              <p:pRg st="0" end="0"/>
+                                            </p:txEl>
+                                          </p:spTgt>
+                                        </p:tgtEl>
+                                        <p:attrNameLst>
+                                          <p:attrName>style.visibility</p:attrName>
+                                        </p:attrNameLst>
+                                      </p:cBhvr>
+                                      <p:to>
+                                        <p:strVal val="visible"/>
+                                      </p:to>
+                                    </p:set>
+                                  </p:childTnLst>
+                                </p:cTn>
+                              </p:par>
+                            </p:childTnLst>
+                          </p:cTn>
+                        </p:par>
+                      </p:childTnLst>
+                    </p:cTn>
+                  </p:par>
+                  <p:par>
+                    <p:cTn id="7" fill="hold">
+                      <p:stCondLst>
+                        <p:cond delay="indefinite"/>
+                      </p:stCondLst>
+                      <p:childTnLst>
+                        <p:par>
+                          <p:cTn id="8" fill="hold">
+                            <p:stCondLst>
+                              <p:cond delay="0"/>
+                            </p:stCondLst>
+                            <p:childTnLst>
+                              <p:par>
+                                <p:cTn id="9" presetID="1" presetClass="entr" presetSubtype="0" fill="hold" nodeType="clickEffect">
+                                  <p:stCondLst>
+                                    <p:cond delay="0"/>
+                                  </p:stCondLst>
+                                  <p:childTnLst>
+                                    <p:set>
+                                      <p:cBhvr>
+                                        <p:cTn id="10" dur="1" fill="hold">
+                                          <p:stCondLst>
+                                            <p:cond delay="0"/>
+                                          </p:stCondLst>
+                                        </p:cTn>
+                                        <p:tgtEl>
+                                          <p:spTgt spid="3">
+                                            <p:txEl>
+                                              <p:pRg st="1" end="1"/>
+                                            </p:txEl>
+                                          </p:spTgt>
+                                        </p:tgtEl>
+                                        <p:attrNameLst>
+                                          <p:attrName>style.visibility</p:attrName>
+                                        </p:attrNameLst>
+                                      </p:cBhvr>
+                                      <p:to>
+                                        <p:strVal val="visible"/>
+                                      </p:to>
+                                    </p:set>
+                                  </p:childTnLst>
+                                </p:cTn>
+                              </p:par>
+                            </p:childTnLst>
+                          </p:cTn>
+                        </p:par>
+                      </p:childTnLst>
+                    </p:cTn>
+                  </p:par>
+                  <p:par>
+                    <p:cTn id="11" fill="hold">
+                      <p:stCondLst>
+                        <p:cond delay="indefinite"/>
+                      </p:stCondLst>
+                      <p:childTnLst>
+                        <p:par>
+                          <p:cTn id="12" fill="hold">
+                            <p:stCondLst>
+                              <p:cond delay="0"/>
+                            </p:stCondLst>
+                            <p:childTnLst>
+                              <p:par>
+                                <p:cTn id="13" presetID="1" presetClass="entr" presetSubtype="0" fill="hold" nodeType="clickEffect">
+                                  <p:stCondLst>
+                                    <p:cond delay="0"/>
+                                  </p:stCondLst>
+                                  <p:childTnLst>
+                                    <p:set>
+                                      <p:cBhvr>
+                                        <p:cTn id="14" dur="1" fill="hold">
+                                          <p:stCondLst>
+                                            <p:cond delay="0"/>
+                                          </p:stCondLst>
+                                        </p:cTn>
+                                        <p:tgtEl>
+                                          <p:spTgt spid="3">
+                                            <p:txEl>
+                                              <p:pRg st="2" end="2"/>
+                                            </p:txEl>
+                                          </p:spTgt>
+                                        </p:tgtEl>
+                                        <p:attrNameLst>
+                                          <p:attrName>style.visibility</p:attrName>
+                                        </p:attrNameLst>
+                                      </p:cBhvr>
+                                      <p:to>
+                                        <p:strVal val="visible"/>
+                                      </p:to>
+                                    </p:set>
+                                  </p:childTnLst>
+                                </p:cTn>
+                              </p:par>
+                            </p:childTnLst>
+                          </p:cTn>
+                        </p:par>
+                      </p:childTnLst>
+                    </p:cTn>
+                  </p:par>
+                </p:childTnLst>
+              </p:cTn>
+              <p:prevCondLst>
+                <p:cond evt="onPrev" delay="0">
+                  <p:tgtEl>
+                    <p:sldTgt/>
+                  </p:tgtEl>
+                </p:cond>
+              </p:prevCondLst>
+              <p:nextCondLst>
+                <p:cond evt="onNext" delay="0">
+                  <p:tgtEl>
+                    <p:sldTgt/>
+                  </p:tgtEl>
+                </p:cond>
+              </p:nextCondLst>
+            </p:seq>
+          </p:childTnLst>
+        </p:cTn>
+      </p:par>
+    </p:tnLst>
+  </p:timing>
 </p:sld>
 </file>
 
@@ -20678,6 +20852,14 @@
 <file path=ppt/slides/slide31.xml><?xml version="1.0" encoding="utf-8"?>
 <p:sld xmlns:a="http://schemas.openxmlformats.org/drawingml/2006/main" xmlns:r="http://schemas.openxmlformats.org/officeDocument/2006/relationships" xmlns:p="http://schemas.openxmlformats.org/presentationml/2006/main" show="0">
   <p:cSld>
+    <p:bg>
+      <p:bgPr>
+        <a:solidFill>
+          <a:srgbClr val="000000"/>
+        </a:solidFill>
+        <a:effectLst/>
+      </p:bgPr>
+    </p:bg>
     <p:spTree>
       <p:nvGrpSpPr>
         <p:cNvPr id="1" name=""/>
@@ -20694,6 +20876,108 @@
       </p:grpSpPr>
       <p:sp>
         <p:nvSpPr>
+          <p:cNvPr id="10" name="Rectangle 9">
+            <a:extLst>
+              <a:ext uri="{FF2B5EF4-FFF2-40B4-BE49-F238E27FC236}">
+                <a16:creationId xmlns:a16="http://schemas.microsoft.com/office/drawing/2014/main" id="{71B2258F-86CA-4D4D-8270-BC05FCDEBFB3}"/>
+              </a:ext>
+              <a:ext uri="{C183D7F6-B498-43B3-948B-1728B52AA6E4}">
+                <adec:decorative xmlns:adec="http://schemas.microsoft.com/office/drawing/2017/decorative" val="1"/>
+              </a:ext>
+            </a:extLst>
+          </p:cNvPr>
+          <p:cNvSpPr>
+            <a:spLocks noGrp="1" noRot="1" noChangeAspect="1" noMove="1" noResize="1" noEditPoints="1" noAdjustHandles="1" noChangeArrowheads="1" noChangeShapeType="1" noTextEdit="1"/>
+          </p:cNvSpPr>
+          <p:nvPr>
+            <p:extLst>
+              <p:ext uri="{386F3935-93C4-4BCD-93E2-E3B085C9AB24}">
+                <p16:designElem xmlns:p16="http://schemas.microsoft.com/office/powerpoint/2015/main" val="1"/>
+              </p:ext>
+            </p:extLst>
+          </p:nvPr>
+        </p:nvSpPr>
+        <p:spPr>
+          <a:xfrm>
+            <a:off x="0" y="0"/>
+            <a:ext cx="12192000" cy="6857999"/>
+          </a:xfrm>
+          <a:prstGeom prst="rect">
+            <a:avLst/>
+          </a:prstGeom>
+          <a:solidFill>
+            <a:srgbClr val="000000"/>
+          </a:solidFill>
+          <a:ln>
+            <a:noFill/>
+          </a:ln>
+        </p:spPr>
+        <p:style>
+          <a:lnRef idx="2">
+            <a:schemeClr val="accent1">
+              <a:shade val="50000"/>
+            </a:schemeClr>
+          </a:lnRef>
+          <a:fillRef idx="1">
+            <a:schemeClr val="accent1"/>
+          </a:fillRef>
+          <a:effectRef idx="0">
+            <a:schemeClr val="accent1"/>
+          </a:effectRef>
+          <a:fontRef idx="minor">
+            <a:schemeClr val="lt1"/>
+          </a:fontRef>
+        </p:style>
+        <p:txBody>
+          <a:bodyPr rtlCol="0" anchor="ctr"/>
+          <a:lstStyle/>
+          <a:p>
+            <a:pPr algn="ctr"/>
+            <a:endParaRPr lang="en-US"/>
+          </a:p>
+        </p:txBody>
+      </p:sp>
+      <p:pic>
+        <p:nvPicPr>
+          <p:cNvPr id="5" name="Picture 4" descr="A picture containing person, grass, outdoor, little&#10;&#10;Description automatically generated">
+            <a:extLst>
+              <a:ext uri="{FF2B5EF4-FFF2-40B4-BE49-F238E27FC236}">
+                <a16:creationId xmlns:a16="http://schemas.microsoft.com/office/drawing/2014/main" id="{3A65597F-113A-4185-925F-5E99B32FFA17}"/>
+              </a:ext>
+            </a:extLst>
+          </p:cNvPr>
+          <p:cNvPicPr>
+            <a:picLocks noChangeAspect="1"/>
+          </p:cNvPicPr>
+          <p:nvPr/>
+        </p:nvPicPr>
+        <p:blipFill rotWithShape="1">
+          <a:blip r:embed="rId3">
+            <a:alphaModFix amt="50000"/>
+            <a:extLst>
+              <a:ext uri="{28A0092B-C50C-407E-A947-70E740481C1C}">
+                <a14:useLocalDpi xmlns:a14="http://schemas.microsoft.com/office/drawing/2010/main" val="0"/>
+              </a:ext>
+              <a:ext uri="{837473B0-CC2E-450A-ABE3-18F120FF3D39}">
+                <a1611:picAttrSrcUrl xmlns:a1611="http://schemas.microsoft.com/office/drawing/2016/11/main" r:id="rId4"/>
+              </a:ext>
+            </a:extLst>
+          </a:blip>
+          <a:srcRect t="2435" b="13295"/>
+          <a:stretch/>
+        </p:blipFill>
+        <p:spPr>
+          <a:xfrm>
+            <a:off x="20" y="1"/>
+            <a:ext cx="12191980" cy="6857999"/>
+          </a:xfrm>
+          <a:prstGeom prst="rect">
+            <a:avLst/>
+          </a:prstGeom>
+        </p:spPr>
+      </p:pic>
+      <p:sp>
+        <p:nvSpPr>
           <p:cNvPr id="2" name="Title 1">
             <a:extLst>
               <a:ext uri="{FF2B5EF4-FFF2-40B4-BE49-F238E27FC236}">
@@ -20708,13 +20992,25 @@
             <p:ph type="title"/>
           </p:nvPr>
         </p:nvSpPr>
-        <p:spPr/>
+        <p:spPr>
+          <a:xfrm>
+            <a:off x="1524000" y="1122362"/>
+            <a:ext cx="9144000" cy="2900518"/>
+          </a:xfrm>
+        </p:spPr>
         <p:txBody>
-          <a:bodyPr/>
+          <a:bodyPr vert="horz" lIns="91440" tIns="45720" rIns="91440" bIns="45720" rtlCol="0" anchor="b">
+            <a:normAutofit/>
+          </a:bodyPr>
           <a:lstStyle/>
           <a:p>
+            <a:pPr algn="ctr"/>
             <a:r>
-              <a:rPr lang="en-US" dirty="0"/>
+              <a:rPr lang="en-US" sz="6000">
+                <a:solidFill>
+                  <a:srgbClr val="FFFFFF"/>
+                </a:solidFill>
+              </a:rPr>
               <a:t>5-min snippet Sex Ratio Equilibrium</a:t>
             </a:r>
           </a:p>
@@ -20736,13 +21032,27 @@
             <p:ph idx="1"/>
           </p:nvPr>
         </p:nvSpPr>
-        <p:spPr/>
+        <p:spPr>
+          <a:xfrm>
+            <a:off x="1524000" y="4159404"/>
+            <a:ext cx="9144000" cy="1098395"/>
+          </a:xfrm>
+        </p:spPr>
         <p:txBody>
-          <a:bodyPr/>
+          <a:bodyPr vert="horz" lIns="91440" tIns="45720" rIns="91440" bIns="45720" rtlCol="0">
+            <a:normAutofit/>
+          </a:bodyPr>
           <a:lstStyle/>
           <a:p>
+            <a:pPr marL="0" indent="0" algn="ctr">
+              <a:buNone/>
+            </a:pPr>
             <a:r>
-              <a:rPr lang="en-US" dirty="0"/>
+              <a:rPr lang="en-US" sz="2400" dirty="0">
+                <a:solidFill>
+                  <a:srgbClr val="FFFFFF"/>
+                </a:solidFill>
+              </a:rPr>
               <a:t>Robust ratio of 1:1 </a:t>
             </a:r>
           </a:p>
@@ -20756,8 +21066,150 @@
     </p:extLst>
   </p:cSld>
   <p:clrMapOvr>
-    <a:masterClrMapping/>
+    <a:overrideClrMapping bg1="dk1" tx1="lt1" bg2="dk2" tx2="lt2" accent1="accent1" accent2="accent2" accent3="accent3" accent4="accent4" accent5="accent5" accent6="accent6" hlink="hlink" folHlink="folHlink"/>
   </p:clrMapOvr>
+  <p:timing>
+    <p:tnLst>
+      <p:par>
+        <p:cTn id="1" dur="indefinite" restart="never" nodeType="tmRoot">
+          <p:childTnLst>
+            <p:seq concurrent="1" nextAc="seek">
+              <p:cTn id="2" dur="indefinite" nodeType="mainSeq">
+                <p:childTnLst>
+                  <p:par>
+                    <p:cTn id="3" fill="hold">
+                      <p:stCondLst>
+                        <p:cond delay="indefinite"/>
+                        <p:cond evt="onBegin" delay="0">
+                          <p:tn val="2"/>
+                        </p:cond>
+                      </p:stCondLst>
+                      <p:childTnLst>
+                        <p:par>
+                          <p:cTn id="4" fill="hold">
+                            <p:stCondLst>
+                              <p:cond delay="0"/>
+                            </p:stCondLst>
+                            <p:childTnLst>
+                              <p:par>
+                                <p:cTn id="5" presetID="10" presetClass="entr" presetSubtype="0" fill="hold" grpId="0" nodeType="withEffect">
+                                  <p:stCondLst>
+                                    <p:cond delay="1000"/>
+                                  </p:stCondLst>
+                                  <p:iterate type="lt">
+                                    <p:tmPct val="10000"/>
+                                  </p:iterate>
+                                  <p:childTnLst>
+                                    <p:set>
+                                      <p:cBhvr>
+                                        <p:cTn id="6" dur="1" fill="hold">
+                                          <p:stCondLst>
+                                            <p:cond delay="0"/>
+                                          </p:stCondLst>
+                                        </p:cTn>
+                                        <p:tgtEl>
+                                          <p:spTgt spid="2"/>
+                                        </p:tgtEl>
+                                        <p:attrNameLst>
+                                          <p:attrName>style.visibility</p:attrName>
+                                        </p:attrNameLst>
+                                      </p:cBhvr>
+                                      <p:to>
+                                        <p:strVal val="visible"/>
+                                      </p:to>
+                                    </p:set>
+                                    <p:animEffect transition="in" filter="fade">
+                                      <p:cBhvr>
+                                        <p:cTn id="7" dur="400"/>
+                                        <p:tgtEl>
+                                          <p:spTgt spid="2"/>
+                                        </p:tgtEl>
+                                      </p:cBhvr>
+                                    </p:animEffect>
+                                  </p:childTnLst>
+                                </p:cTn>
+                              </p:par>
+                            </p:childTnLst>
+                          </p:cTn>
+                        </p:par>
+                      </p:childTnLst>
+                    </p:cTn>
+                  </p:par>
+                  <p:par>
+                    <p:cTn id="8" fill="hold">
+                      <p:stCondLst>
+                        <p:cond delay="indefinite"/>
+                      </p:stCondLst>
+                      <p:childTnLst>
+                        <p:par>
+                          <p:cTn id="9" fill="hold">
+                            <p:stCondLst>
+                              <p:cond delay="0"/>
+                            </p:stCondLst>
+                            <p:childTnLst>
+                              <p:par>
+                                <p:cTn id="10" presetID="1" presetClass="entr" presetSubtype="0" fill="hold" grpId="0" nodeType="clickEffect">
+                                  <p:stCondLst>
+                                    <p:cond delay="0"/>
+                                  </p:stCondLst>
+                                  <p:childTnLst>
+                                    <p:set>
+                                      <p:cBhvr>
+                                        <p:cTn id="11" dur="1" fill="hold">
+                                          <p:stCondLst>
+                                            <p:cond delay="0"/>
+                                          </p:stCondLst>
+                                        </p:cTn>
+                                        <p:tgtEl>
+                                          <p:spTgt spid="3">
+                                            <p:txEl>
+                                              <p:pRg st="0" end="0"/>
+                                            </p:txEl>
+                                          </p:spTgt>
+                                        </p:tgtEl>
+                                        <p:attrNameLst>
+                                          <p:attrName>style.visibility</p:attrName>
+                                        </p:attrNameLst>
+                                      </p:cBhvr>
+                                      <p:to>
+                                        <p:strVal val="visible"/>
+                                      </p:to>
+                                    </p:set>
+                                  </p:childTnLst>
+                                </p:cTn>
+                              </p:par>
+                            </p:childTnLst>
+                          </p:cTn>
+                        </p:par>
+                      </p:childTnLst>
+                    </p:cTn>
+                  </p:par>
+                </p:childTnLst>
+              </p:cTn>
+              <p:prevCondLst>
+                <p:cond evt="onPrev" delay="0">
+                  <p:tgtEl>
+                    <p:sldTgt/>
+                  </p:tgtEl>
+                </p:cond>
+              </p:prevCondLst>
+              <p:nextCondLst>
+                <p:cond evt="onNext" delay="0">
+                  <p:tgtEl>
+                    <p:sldTgt/>
+                  </p:tgtEl>
+                </p:cond>
+              </p:nextCondLst>
+            </p:seq>
+          </p:childTnLst>
+        </p:cTn>
+      </p:par>
+    </p:tnLst>
+    <p:bldLst>
+      <p:bldP spid="2" grpId="0"/>
+      <p:bldP spid="3" grpId="0" build="p"/>
+    </p:bldLst>
+  </p:timing>
 </p:sld>
 </file>
 
@@ -22212,7 +22664,7 @@
 </file>
 
 <file path=ppt/slides/slide5.xml><?xml version="1.0" encoding="utf-8"?>
-<p:sld xmlns:a="http://schemas.openxmlformats.org/drawingml/2006/main" xmlns:r="http://schemas.openxmlformats.org/officeDocument/2006/relationships" xmlns:p="http://schemas.openxmlformats.org/presentationml/2006/main" show="0">
+<p:sld xmlns:a="http://schemas.openxmlformats.org/drawingml/2006/main" xmlns:r="http://schemas.openxmlformats.org/officeDocument/2006/relationships" xmlns:p="http://schemas.openxmlformats.org/presentationml/2006/main">
   <p:cSld>
     <p:bg>
       <p:bgPr>
@@ -23147,7 +23599,7 @@
 </file>
 
 <file path=ppt/slides/slide7.xml><?xml version="1.0" encoding="utf-8"?>
-<p:sld xmlns:a="http://schemas.openxmlformats.org/drawingml/2006/main" xmlns:r="http://schemas.openxmlformats.org/officeDocument/2006/relationships" xmlns:p="http://schemas.openxmlformats.org/presentationml/2006/main" show="0">
+<p:sld xmlns:a="http://schemas.openxmlformats.org/drawingml/2006/main" xmlns:r="http://schemas.openxmlformats.org/officeDocument/2006/relationships" xmlns:p="http://schemas.openxmlformats.org/presentationml/2006/main">
   <p:cSld>
     <p:bg>
       <p:bgPr>
@@ -25369,6 +25821,15 @@
 </file>
 
 <file path=customXml/item1.xml><?xml version="1.0" encoding="utf-8"?>
+<?mso-contentType ?>
+<FormTemplates xmlns="http://schemas.microsoft.com/sharepoint/v3/contenttype/forms">
+  <Display>DocumentLibraryForm</Display>
+  <Edit>DocumentLibraryForm</Edit>
+  <New>DocumentLibraryForm</New>
+</FormTemplates>
+</file>
+
+<file path=customXml/item2.xml><?xml version="1.0" encoding="utf-8"?>
 <ct:contentTypeSchema xmlns:ct="http://schemas.microsoft.com/office/2006/metadata/contentType" xmlns:ma="http://schemas.microsoft.com/office/2006/metadata/properties/metaAttributes" ct:_="" ma:_="" ma:contentTypeName="Document" ma:contentTypeID="0x01010079F111ED35F8CC479449609E8A0923A6" ma:contentTypeVersion="11" ma:contentTypeDescription="Create a new document." ma:contentTypeScope="" ma:versionID="96291512c1ee715ab617f4c07df79fc1">
   <xsd:schema xmlns:xsd="http://www.w3.org/2001/XMLSchema" xmlns:xs="http://www.w3.org/2001/XMLSchema" xmlns:p="http://schemas.microsoft.com/office/2006/metadata/properties" xmlns:ns2="71af3243-3dd4-4a8d-8c0d-dd76da1f02a5" xmlns:ns3="16c05727-aa75-4e4a-9b5f-8a80a1165891" targetNamespace="http://schemas.microsoft.com/office/2006/metadata/properties" ma:root="true" ma:fieldsID="8256c27c40ca5c40ce1cf6c44f0205df" ns2:_="" ns3:_="">
     <xsd:import namespace="71af3243-3dd4-4a8d-8c0d-dd76da1f02a5"/>
@@ -25579,15 +26040,6 @@
 </ct:contentTypeSchema>
 </file>
 
-<file path=customXml/item2.xml><?xml version="1.0" encoding="utf-8"?>
-<?mso-contentType ?>
-<FormTemplates xmlns="http://schemas.microsoft.com/sharepoint/v3/contenttype/forms">
-  <Display>DocumentLibraryForm</Display>
-  <Edit>DocumentLibraryForm</Edit>
-  <New>DocumentLibraryForm</New>
-</FormTemplates>
-</file>
-
 <file path=customXml/item3.xml><?xml version="1.0" encoding="utf-8"?>
 <p:properties xmlns:p="http://schemas.microsoft.com/office/2006/metadata/properties" xmlns:xsi="http://www.w3.org/2001/XMLSchema-instance" xmlns:pc="http://schemas.microsoft.com/office/infopath/2007/PartnerControls">
   <documentManagement>
@@ -25597,6 +26049,14 @@
 </file>
 
 <file path=customXml/itemProps1.xml><?xml version="1.0" encoding="utf-8"?>
+<ds:datastoreItem xmlns:ds="http://schemas.openxmlformats.org/officeDocument/2006/customXml" ds:itemID="{5CA875DA-F9FD-4F83-A049-3B1027B542DE}">
+  <ds:schemaRefs>
+    <ds:schemaRef ds:uri="http://schemas.microsoft.com/sharepoint/v3/contenttype/forms"/>
+  </ds:schemaRefs>
+</ds:datastoreItem>
+</file>
+
+<file path=customXml/itemProps2.xml><?xml version="1.0" encoding="utf-8"?>
 <ds:datastoreItem xmlns:ds="http://schemas.openxmlformats.org/officeDocument/2006/customXml" ds:itemID="{B2AB02E3-5ADF-4BF0-9C1B-35CDF3FE95B0}">
   <ds:schemaRefs>
     <ds:schemaRef ds:uri="http://schemas.microsoft.com/office/2006/metadata/contentType"/>
@@ -25615,14 +26075,6 @@
 </ds:datastoreItem>
 </file>
 
-<file path=customXml/itemProps2.xml><?xml version="1.0" encoding="utf-8"?>
-<ds:datastoreItem xmlns:ds="http://schemas.openxmlformats.org/officeDocument/2006/customXml" ds:itemID="{5CA875DA-F9FD-4F83-A049-3B1027B542DE}">
-  <ds:schemaRefs>
-    <ds:schemaRef ds:uri="http://schemas.microsoft.com/sharepoint/v3/contenttype/forms"/>
-  </ds:schemaRefs>
-</ds:datastoreItem>
-</file>
-
 <file path=customXml/itemProps3.xml><?xml version="1.0" encoding="utf-8"?>
 <ds:datastoreItem xmlns:ds="http://schemas.openxmlformats.org/officeDocument/2006/customXml" ds:itemID="{03C7D9E6-B0D9-433E-BD46-EB60F64F4DA8}">
   <ds:schemaRefs>

</xml_diff>